<commit_message>
Updated Lecture 8 - homework and error
</commit_message>
<xml_diff>
--- a/08-Exceptions.pptx
+++ b/08-Exceptions.pptx
@@ -235,7 +235,7 @@
           <a:p>
             <a:fld id="{1A052DDE-B79B-4585-97B6-DCDE6083B029}" type="datetimeFigureOut">
               <a:rPr lang="bg-BG" smtClean="0"/>
-              <a:t>30.7.2015 г.</a:t>
+              <a:t>31.7.2015 г.</a:t>
             </a:fld>
             <a:endParaRPr lang="bg-BG"/>
           </a:p>
@@ -684,7 +684,7 @@
           <a:p>
             <a:fld id="{3EA744D9-3FBE-48D8-BF2A-85DF203E4D20}" type="datetimeFigureOut">
               <a:rPr lang="bg-BG" smtClean="0"/>
-              <a:t>30.7.2015 г.</a:t>
+              <a:t>31.7.2015 г.</a:t>
             </a:fld>
             <a:endParaRPr lang="bg-BG"/>
           </a:p>
@@ -854,7 +854,7 @@
           <a:p>
             <a:fld id="{3EA744D9-3FBE-48D8-BF2A-85DF203E4D20}" type="datetimeFigureOut">
               <a:rPr lang="bg-BG" smtClean="0"/>
-              <a:t>30.7.2015 г.</a:t>
+              <a:t>31.7.2015 г.</a:t>
             </a:fld>
             <a:endParaRPr lang="bg-BG"/>
           </a:p>
@@ -1034,7 +1034,7 @@
           <a:p>
             <a:fld id="{3EA744D9-3FBE-48D8-BF2A-85DF203E4D20}" type="datetimeFigureOut">
               <a:rPr lang="bg-BG" smtClean="0"/>
-              <a:t>30.7.2015 г.</a:t>
+              <a:t>31.7.2015 г.</a:t>
             </a:fld>
             <a:endParaRPr lang="bg-BG"/>
           </a:p>
@@ -1204,7 +1204,7 @@
           <a:p>
             <a:fld id="{3EA744D9-3FBE-48D8-BF2A-85DF203E4D20}" type="datetimeFigureOut">
               <a:rPr lang="bg-BG" smtClean="0"/>
-              <a:t>30.7.2015 г.</a:t>
+              <a:t>31.7.2015 г.</a:t>
             </a:fld>
             <a:endParaRPr lang="bg-BG"/>
           </a:p>
@@ -1450,7 +1450,7 @@
           <a:p>
             <a:fld id="{3EA744D9-3FBE-48D8-BF2A-85DF203E4D20}" type="datetimeFigureOut">
               <a:rPr lang="bg-BG" smtClean="0"/>
-              <a:t>30.7.2015 г.</a:t>
+              <a:t>31.7.2015 г.</a:t>
             </a:fld>
             <a:endParaRPr lang="bg-BG"/>
           </a:p>
@@ -1738,7 +1738,7 @@
           <a:p>
             <a:fld id="{3EA744D9-3FBE-48D8-BF2A-85DF203E4D20}" type="datetimeFigureOut">
               <a:rPr lang="bg-BG" smtClean="0"/>
-              <a:t>30.7.2015 г.</a:t>
+              <a:t>31.7.2015 г.</a:t>
             </a:fld>
             <a:endParaRPr lang="bg-BG"/>
           </a:p>
@@ -2160,7 +2160,7 @@
           <a:p>
             <a:fld id="{3EA744D9-3FBE-48D8-BF2A-85DF203E4D20}" type="datetimeFigureOut">
               <a:rPr lang="bg-BG" smtClean="0"/>
-              <a:t>30.7.2015 г.</a:t>
+              <a:t>31.7.2015 г.</a:t>
             </a:fld>
             <a:endParaRPr lang="bg-BG"/>
           </a:p>
@@ -2278,7 +2278,7 @@
           <a:p>
             <a:fld id="{3EA744D9-3FBE-48D8-BF2A-85DF203E4D20}" type="datetimeFigureOut">
               <a:rPr lang="bg-BG" smtClean="0"/>
-              <a:t>30.7.2015 г.</a:t>
+              <a:t>31.7.2015 г.</a:t>
             </a:fld>
             <a:endParaRPr lang="bg-BG"/>
           </a:p>
@@ -2373,7 +2373,7 @@
           <a:p>
             <a:fld id="{3EA744D9-3FBE-48D8-BF2A-85DF203E4D20}" type="datetimeFigureOut">
               <a:rPr lang="bg-BG" smtClean="0"/>
-              <a:t>30.7.2015 г.</a:t>
+              <a:t>31.7.2015 г.</a:t>
             </a:fld>
             <a:endParaRPr lang="bg-BG"/>
           </a:p>
@@ -2650,7 +2650,7 @@
           <a:p>
             <a:fld id="{3EA744D9-3FBE-48D8-BF2A-85DF203E4D20}" type="datetimeFigureOut">
               <a:rPr lang="bg-BG" smtClean="0"/>
-              <a:t>30.7.2015 г.</a:t>
+              <a:t>31.7.2015 г.</a:t>
             </a:fld>
             <a:endParaRPr lang="bg-BG"/>
           </a:p>
@@ -2903,7 +2903,7 @@
           <a:p>
             <a:fld id="{3EA744D9-3FBE-48D8-BF2A-85DF203E4D20}" type="datetimeFigureOut">
               <a:rPr lang="bg-BG" smtClean="0"/>
-              <a:t>30.7.2015 г.</a:t>
+              <a:t>31.7.2015 г.</a:t>
             </a:fld>
             <a:endParaRPr lang="bg-BG"/>
           </a:p>
@@ -3125,7 +3125,7 @@
           <a:p>
             <a:fld id="{3EA744D9-3FBE-48D8-BF2A-85DF203E4D20}" type="datetimeFigureOut">
               <a:rPr lang="bg-BG" smtClean="0"/>
-              <a:t>30.7.2015 г.</a:t>
+              <a:t>31.7.2015 г.</a:t>
             </a:fld>
             <a:endParaRPr lang="bg-BG"/>
           </a:p>
@@ -4296,12 +4296,20 @@
           <a:p>
             <a:pPr algn="l"/>
             <a:r>
+              <a:rPr lang="bg-BG" dirty="0" smtClean="0">
+                <a:solidFill>
+                  <a:schemeClr val="accent6"/>
+                </a:solidFill>
+              </a:rPr>
+              <a:t>Хвърляне </a:t>
+            </a:r>
+            <a:r>
               <a:rPr lang="bg-BG" dirty="0">
                 <a:solidFill>
                   <a:schemeClr val="accent6"/>
                 </a:solidFill>
               </a:rPr>
-              <a:t>Създаване на изключения</a:t>
+              <a:t>на изключения</a:t>
             </a:r>
           </a:p>
         </p:txBody>
@@ -4396,7 +4404,37 @@
                   </a:schemeClr>
                 </a:solidFill>
               </a:rPr>
-              <a:t>се създават посредством ключовата дума throw последвана от инстанция на клас наследник на </a:t>
+              <a:t>се </a:t>
+            </a:r>
+            <a:r>
+              <a:rPr lang="ru-RU" dirty="0" err="1" smtClean="0">
+                <a:solidFill>
+                  <a:schemeClr val="bg1">
+                    <a:lumMod val="95000"/>
+                  </a:schemeClr>
+                </a:solidFill>
+              </a:rPr>
+              <a:t>хвърлят</a:t>
+            </a:r>
+            <a:r>
+              <a:rPr lang="ru-RU" dirty="0" smtClean="0">
+                <a:solidFill>
+                  <a:schemeClr val="bg1">
+                    <a:lumMod val="95000"/>
+                  </a:schemeClr>
+                </a:solidFill>
+              </a:rPr>
+              <a:t> посредством </a:t>
+            </a:r>
+            <a:r>
+              <a:rPr lang="ru-RU" dirty="0">
+                <a:solidFill>
+                  <a:schemeClr val="bg1">
+                    <a:lumMod val="95000"/>
+                  </a:schemeClr>
+                </a:solidFill>
+              </a:rPr>
+              <a:t>ключовата дума throw последвана от инстанция на клас наследник на </a:t>
             </a:r>
             <a:r>
               <a:rPr lang="ru-RU" dirty="0" smtClean="0">
@@ -4479,12 +4517,12 @@
           <a:p>
             <a:pPr algn="l"/>
             <a:r>
-              <a:rPr lang="bg-BG" dirty="0" smtClean="0">
+              <a:rPr lang="bg-BG" smtClean="0">
                 <a:solidFill>
                   <a:schemeClr val="accent6"/>
                 </a:solidFill>
               </a:rPr>
-              <a:t>Демо - Създаване </a:t>
+              <a:t>Демо – Хвърляне на </a:t>
             </a:r>
             <a:r>
               <a:rPr lang="bg-BG" dirty="0">
@@ -4492,7 +4530,7 @@
                   <a:schemeClr val="accent6"/>
                 </a:solidFill>
               </a:rPr>
-              <a:t>на изключения</a:t>
+              <a:t>изключения</a:t>
             </a:r>
           </a:p>
         </p:txBody>
@@ -5318,13 +5356,6 @@
               </a:rPr>
               <a:t>.</a:t>
             </a:r>
-            <a:endParaRPr lang="ru-RU" sz="2800" dirty="0">
-              <a:solidFill>
-                <a:schemeClr val="bg1">
-                  <a:lumMod val="95000"/>
-                </a:schemeClr>
-              </a:solidFill>
-            </a:endParaRPr>
           </a:p>
         </p:txBody>
       </p:sp>
@@ -7045,36 +7076,548 @@
           </a:bodyPr>
           <a:lstStyle/>
           <a:p>
-            <a:pPr>
-              <a:buFont typeface="Wingdings" panose="05000000000000000000" pitchFamily="2" charset="2"/>
-              <a:buChar char="§"/>
+            <a:pPr marL="0" indent="0">
+              <a:buNone/>
             </a:pPr>
             <a:r>
-              <a:rPr lang="ru-RU" sz="2400" dirty="0">
-                <a:solidFill>
-                  <a:schemeClr val="bg1">
-                    <a:lumMod val="95000"/>
-                  </a:schemeClr>
-                </a:solidFill>
-              </a:rPr>
-              <a:t>Напишете метод, който приема като параметър име на текстов файл и прочита съдържанието му и го връща като String. Напишете метод, който приема като параметри име на текстов файл и String и записва низa във файла. Нека в самите методи да няма TRY-CATCH конструкция. Използвайте методите в main метода.</a:t>
-            </a:r>
-          </a:p>
-          <a:p>
-            <a:pPr>
-              <a:buFont typeface="Wingdings" panose="05000000000000000000" pitchFamily="2" charset="2"/>
-              <a:buChar char="§"/>
+              <a:rPr lang="ru-RU" sz="2000" dirty="0" err="1" smtClean="0">
+                <a:solidFill>
+                  <a:schemeClr val="bg1">
+                    <a:lumMod val="95000"/>
+                  </a:schemeClr>
+                </a:solidFill>
+              </a:rPr>
+              <a:t>Направете</a:t>
+            </a:r>
+            <a:r>
+              <a:rPr lang="ru-RU" sz="2000" dirty="0" smtClean="0">
+                <a:solidFill>
+                  <a:schemeClr val="bg1">
+                    <a:lumMod val="95000"/>
+                  </a:schemeClr>
+                </a:solidFill>
+              </a:rPr>
+              <a:t> един базов </a:t>
+            </a:r>
+            <a:r>
+              <a:rPr lang="ru-RU" sz="2000" dirty="0" err="1" smtClean="0">
+                <a:solidFill>
+                  <a:schemeClr val="bg1">
+                    <a:lumMod val="95000"/>
+                  </a:schemeClr>
+                </a:solidFill>
+              </a:rPr>
+              <a:t>клас</a:t>
+            </a:r>
+            <a:r>
+              <a:rPr lang="ru-RU" sz="2000" dirty="0" smtClean="0">
+                <a:solidFill>
+                  <a:schemeClr val="bg1">
+                    <a:lumMod val="95000"/>
+                  </a:schemeClr>
+                </a:solidFill>
+              </a:rPr>
+              <a:t> </a:t>
+            </a:r>
+            <a:r>
+              <a:rPr lang="en-US" sz="2000" dirty="0" smtClean="0">
+                <a:solidFill>
+                  <a:schemeClr val="bg1">
+                    <a:lumMod val="95000"/>
+                  </a:schemeClr>
+                </a:solidFill>
+              </a:rPr>
+              <a:t>Account </a:t>
+            </a:r>
+            <a:r>
+              <a:rPr lang="bg-BG" sz="2000" dirty="0" smtClean="0">
+                <a:solidFill>
+                  <a:schemeClr val="bg1">
+                    <a:lumMod val="95000"/>
+                  </a:schemeClr>
+                </a:solidFill>
+              </a:rPr>
+              <a:t>с едно поле, което да пази сумата в една сметка.</a:t>
+            </a:r>
+            <a:r>
+              <a:rPr lang="bg-BG" sz="2000" dirty="0" smtClean="0">
+                <a:solidFill>
+                  <a:schemeClr val="bg1">
+                    <a:lumMod val="95000"/>
+                  </a:schemeClr>
+                </a:solidFill>
+              </a:rPr>
+              <a:t> </a:t>
+            </a:r>
+            <a:r>
+              <a:rPr lang="bg-BG" sz="2000" dirty="0" smtClean="0">
+                <a:solidFill>
+                  <a:schemeClr val="bg1">
+                    <a:lumMod val="95000"/>
+                  </a:schemeClr>
+                </a:solidFill>
+              </a:rPr>
+              <a:t>Направете два класа наследници </a:t>
+            </a:r>
+            <a:r>
+              <a:rPr lang="en-US" sz="2000" dirty="0" err="1" smtClean="0">
+                <a:solidFill>
+                  <a:schemeClr val="bg1">
+                    <a:lumMod val="95000"/>
+                  </a:schemeClr>
+                </a:solidFill>
+              </a:rPr>
+              <a:t>PersonalAccount</a:t>
+            </a:r>
+            <a:r>
+              <a:rPr lang="en-US" sz="2000" dirty="0" smtClean="0">
+                <a:solidFill>
+                  <a:schemeClr val="bg1">
+                    <a:lumMod val="95000"/>
+                  </a:schemeClr>
+                </a:solidFill>
+              </a:rPr>
+              <a:t> (</a:t>
+            </a:r>
+            <a:r>
+              <a:rPr lang="bg-BG" sz="2000" dirty="0" smtClean="0">
+                <a:solidFill>
+                  <a:schemeClr val="bg1">
+                    <a:lumMod val="95000"/>
+                  </a:schemeClr>
+                </a:solidFill>
+              </a:rPr>
+              <a:t>с още две </a:t>
+            </a:r>
+            <a:r>
+              <a:rPr lang="bg-BG" sz="2000" dirty="0" smtClean="0">
+                <a:solidFill>
+                  <a:schemeClr val="bg1">
+                    <a:lumMod val="95000"/>
+                  </a:schemeClr>
+                </a:solidFill>
+              </a:rPr>
+              <a:t>полета: име и ЕГН) и </a:t>
+            </a:r>
+            <a:r>
+              <a:rPr lang="en-US" sz="2000" dirty="0" err="1" smtClean="0">
+                <a:solidFill>
+                  <a:schemeClr val="bg1">
+                    <a:lumMod val="95000"/>
+                  </a:schemeClr>
+                </a:solidFill>
+              </a:rPr>
+              <a:t>CoorporativeAccount</a:t>
+            </a:r>
+            <a:r>
+              <a:rPr lang="bg-BG" sz="2000" dirty="0" smtClean="0">
+                <a:solidFill>
+                  <a:schemeClr val="bg1">
+                    <a:lumMod val="95000"/>
+                  </a:schemeClr>
+                </a:solidFill>
+              </a:rPr>
+              <a:t> (с още две полета: име на фирмата и </a:t>
+            </a:r>
+            <a:r>
+              <a:rPr lang="bg-BG" sz="2000" dirty="0" err="1" smtClean="0">
+                <a:solidFill>
+                  <a:schemeClr val="bg1">
+                    <a:lumMod val="95000"/>
+                  </a:schemeClr>
+                </a:solidFill>
+              </a:rPr>
+              <a:t>булстат</a:t>
+            </a:r>
+            <a:r>
+              <a:rPr lang="bg-BG" sz="2000" dirty="0" smtClean="0">
+                <a:solidFill>
+                  <a:schemeClr val="bg1">
+                    <a:lumMod val="95000"/>
+                  </a:schemeClr>
+                </a:solidFill>
+              </a:rPr>
+              <a:t>). Нека  всички полета да имат  </a:t>
+            </a:r>
+            <a:r>
+              <a:rPr lang="bg-BG" sz="2000" dirty="0">
+                <a:solidFill>
+                  <a:schemeClr val="bg1">
+                    <a:lumMod val="95000"/>
+                  </a:schemeClr>
+                </a:solidFill>
+              </a:rPr>
+              <a:t>съответните</a:t>
+            </a:r>
+            <a:r>
+              <a:rPr lang="en-US" sz="2000" dirty="0">
+                <a:solidFill>
+                  <a:schemeClr val="bg1">
+                    <a:lumMod val="95000"/>
+                  </a:schemeClr>
+                </a:solidFill>
+              </a:rPr>
+              <a:t> getter </a:t>
+            </a:r>
+            <a:r>
+              <a:rPr lang="bg-BG" sz="2000" dirty="0">
+                <a:solidFill>
+                  <a:schemeClr val="bg1">
+                    <a:lumMod val="95000"/>
+                  </a:schemeClr>
+                </a:solidFill>
+              </a:rPr>
+              <a:t>и </a:t>
+            </a:r>
+            <a:r>
+              <a:rPr lang="en-US" sz="2000" dirty="0" smtClean="0">
+                <a:solidFill>
+                  <a:schemeClr val="bg1">
+                    <a:lumMod val="95000"/>
+                  </a:schemeClr>
+                </a:solidFill>
+              </a:rPr>
+              <a:t>setter</a:t>
+            </a:r>
+            <a:r>
+              <a:rPr lang="bg-BG" sz="2000" dirty="0">
+                <a:solidFill>
+                  <a:schemeClr val="bg1">
+                    <a:lumMod val="95000"/>
+                  </a:schemeClr>
+                </a:solidFill>
+              </a:rPr>
+              <a:t> </a:t>
+            </a:r>
+            <a:r>
+              <a:rPr lang="bg-BG" sz="2000" dirty="0" smtClean="0">
+                <a:solidFill>
+                  <a:schemeClr val="bg1">
+                    <a:lumMod val="95000"/>
+                  </a:schemeClr>
+                </a:solidFill>
+              </a:rPr>
+              <a:t>методи.</a:t>
+            </a:r>
+            <a:endParaRPr lang="ru-RU" sz="2000" dirty="0" smtClean="0">
+              <a:solidFill>
+                <a:schemeClr val="bg1">
+                  <a:lumMod val="95000"/>
+                </a:schemeClr>
+              </a:solidFill>
+            </a:endParaRPr>
+          </a:p>
+          <a:p>
+            <a:pPr marL="0" indent="0">
+              <a:buNone/>
             </a:pPr>
             <a:r>
-              <a:rPr lang="ru-RU" sz="2400" dirty="0">
-                <a:solidFill>
-                  <a:schemeClr val="bg1">
-                    <a:lumMod val="95000"/>
-                  </a:schemeClr>
-                </a:solidFill>
-              </a:rPr>
-              <a:t>Напишете програма, която чете текстов файл ред по ред. Ако редът не завършва с точка, въпросителен или удивителен знах, хвърлете ваше собствено изключение SentenceNotCompletedException. </a:t>
-            </a:r>
+              <a:rPr lang="ru-RU" sz="2000" dirty="0" smtClean="0">
+                <a:solidFill>
+                  <a:schemeClr val="bg1">
+                    <a:lumMod val="95000"/>
+                  </a:schemeClr>
+                </a:solidFill>
+              </a:rPr>
+              <a:t>Напишете метод, </a:t>
+            </a:r>
+            <a:r>
+              <a:rPr lang="ru-RU" sz="2000" dirty="0" err="1" smtClean="0">
+                <a:solidFill>
+                  <a:schemeClr val="bg1">
+                    <a:lumMod val="95000"/>
+                  </a:schemeClr>
+                </a:solidFill>
+              </a:rPr>
+              <a:t>който</a:t>
+            </a:r>
+            <a:r>
+              <a:rPr lang="ru-RU" sz="2000" dirty="0" smtClean="0">
+                <a:solidFill>
+                  <a:schemeClr val="bg1">
+                    <a:lumMod val="95000"/>
+                  </a:schemeClr>
+                </a:solidFill>
+              </a:rPr>
+              <a:t> приема </a:t>
+            </a:r>
+            <a:r>
+              <a:rPr lang="ru-RU" sz="2000" dirty="0" err="1" smtClean="0">
+                <a:solidFill>
+                  <a:schemeClr val="bg1">
+                    <a:lumMod val="95000"/>
+                  </a:schemeClr>
+                </a:solidFill>
+              </a:rPr>
+              <a:t>като</a:t>
+            </a:r>
+            <a:r>
+              <a:rPr lang="ru-RU" sz="2000" dirty="0" smtClean="0">
+                <a:solidFill>
+                  <a:schemeClr val="bg1">
+                    <a:lumMod val="95000"/>
+                  </a:schemeClr>
+                </a:solidFill>
+              </a:rPr>
+              <a:t> </a:t>
+            </a:r>
+            <a:r>
+              <a:rPr lang="ru-RU" sz="2000" dirty="0" err="1" smtClean="0">
+                <a:solidFill>
+                  <a:schemeClr val="bg1">
+                    <a:lumMod val="95000"/>
+                  </a:schemeClr>
+                </a:solidFill>
+              </a:rPr>
+              <a:t>параметър</a:t>
+            </a:r>
+            <a:r>
+              <a:rPr lang="ru-RU" sz="2000" dirty="0" smtClean="0">
+                <a:solidFill>
+                  <a:schemeClr val="bg1">
+                    <a:lumMod val="95000"/>
+                  </a:schemeClr>
+                </a:solidFill>
+              </a:rPr>
+              <a:t> </a:t>
+            </a:r>
+            <a:r>
+              <a:rPr lang="en-US" sz="2000" dirty="0" smtClean="0">
+                <a:solidFill>
+                  <a:schemeClr val="bg1">
+                    <a:lumMod val="95000"/>
+                  </a:schemeClr>
+                </a:solidFill>
+              </a:rPr>
+              <a:t>object </a:t>
+            </a:r>
+            <a:r>
+              <a:rPr lang="bg-BG" sz="2000" dirty="0" smtClean="0">
+                <a:solidFill>
+                  <a:schemeClr val="bg1">
+                    <a:lumMod val="95000"/>
+                  </a:schemeClr>
+                </a:solidFill>
+              </a:rPr>
+              <a:t>и проверява дали подаденият обект е наследник на </a:t>
+            </a:r>
+            <a:r>
+              <a:rPr lang="en-US" sz="2000" dirty="0" smtClean="0">
+                <a:solidFill>
+                  <a:schemeClr val="bg1">
+                    <a:lumMod val="95000"/>
+                  </a:schemeClr>
+                </a:solidFill>
+              </a:rPr>
+              <a:t>Account. </a:t>
+            </a:r>
+            <a:r>
+              <a:rPr lang="bg-BG" sz="2000" dirty="0" smtClean="0">
+                <a:solidFill>
+                  <a:schemeClr val="bg1">
+                    <a:lumMod val="95000"/>
+                  </a:schemeClr>
+                </a:solidFill>
+              </a:rPr>
+              <a:t>Ако подаденият обект не е наследник на </a:t>
+            </a:r>
+            <a:r>
+              <a:rPr lang="en-US" sz="2000" dirty="0" smtClean="0">
+                <a:solidFill>
+                  <a:schemeClr val="bg1">
+                    <a:lumMod val="95000"/>
+                  </a:schemeClr>
+                </a:solidFill>
+              </a:rPr>
+              <a:t>Account</a:t>
+            </a:r>
+            <a:r>
+              <a:rPr lang="bg-BG" sz="2000" dirty="0" smtClean="0">
+                <a:solidFill>
+                  <a:schemeClr val="bg1">
+                    <a:lumMod val="95000"/>
+                  </a:schemeClr>
+                </a:solidFill>
+              </a:rPr>
+              <a:t>, то той трябва да хвърли собствен </a:t>
+            </a:r>
+            <a:r>
+              <a:rPr lang="en-US" sz="2000" dirty="0" smtClean="0">
+                <a:solidFill>
+                  <a:schemeClr val="bg1">
+                    <a:lumMod val="95000"/>
+                  </a:schemeClr>
+                </a:solidFill>
+              </a:rPr>
+              <a:t>Exception (</a:t>
+            </a:r>
+            <a:r>
+              <a:rPr lang="en-US" sz="2000" dirty="0" err="1" smtClean="0">
+                <a:solidFill>
+                  <a:schemeClr val="bg1">
+                    <a:lumMod val="95000"/>
+                  </a:schemeClr>
+                </a:solidFill>
+              </a:rPr>
+              <a:t>InvalidAccount</a:t>
+            </a:r>
+            <a:r>
+              <a:rPr lang="ru-RU" sz="2000" dirty="0" err="1" smtClean="0">
+                <a:solidFill>
+                  <a:schemeClr val="bg1">
+                    <a:lumMod val="95000"/>
+                  </a:schemeClr>
+                </a:solidFill>
+              </a:rPr>
+              <a:t>Exception</a:t>
+            </a:r>
+            <a:r>
+              <a:rPr lang="en-US" sz="2000" dirty="0" smtClean="0">
+                <a:solidFill>
+                  <a:schemeClr val="bg1">
+                    <a:lumMod val="95000"/>
+                  </a:schemeClr>
+                </a:solidFill>
+              </a:rPr>
+              <a:t>)</a:t>
+            </a:r>
+            <a:r>
+              <a:rPr lang="bg-BG" sz="2000" dirty="0" smtClean="0">
+                <a:solidFill>
+                  <a:schemeClr val="bg1">
+                    <a:lumMod val="95000"/>
+                  </a:schemeClr>
+                </a:solidFill>
+              </a:rPr>
+              <a:t>, а иначе методът трябва да върне ЕНГ или </a:t>
+            </a:r>
+            <a:r>
+              <a:rPr lang="bg-BG" sz="2000" dirty="0" err="1" smtClean="0">
+                <a:solidFill>
+                  <a:schemeClr val="bg1">
+                    <a:lumMod val="95000"/>
+                  </a:schemeClr>
+                </a:solidFill>
+              </a:rPr>
+              <a:t>булстат</a:t>
+            </a:r>
+            <a:r>
+              <a:rPr lang="bg-BG" sz="2000" dirty="0" smtClean="0">
+                <a:solidFill>
+                  <a:schemeClr val="bg1">
+                    <a:lumMod val="95000"/>
+                  </a:schemeClr>
+                </a:solidFill>
+              </a:rPr>
+              <a:t>. Нека методът да няма </a:t>
+            </a:r>
+            <a:r>
+              <a:rPr lang="en-US" sz="2000" dirty="0" smtClean="0">
+                <a:solidFill>
+                  <a:schemeClr val="bg1">
+                    <a:lumMod val="95000"/>
+                  </a:schemeClr>
+                </a:solidFill>
+              </a:rPr>
+              <a:t>TRY-CATCH </a:t>
+            </a:r>
+            <a:r>
+              <a:rPr lang="bg-BG" sz="2000" dirty="0" smtClean="0">
+                <a:solidFill>
+                  <a:schemeClr val="bg1">
+                    <a:lumMod val="95000"/>
+                  </a:schemeClr>
+                </a:solidFill>
+              </a:rPr>
+              <a:t>блок и да остави грижата за изключенията на тези, които ще </a:t>
+            </a:r>
+            <a:r>
+              <a:rPr lang="bg-BG" sz="2000" smtClean="0">
+                <a:solidFill>
+                  <a:schemeClr val="bg1">
+                    <a:lumMod val="95000"/>
+                  </a:schemeClr>
+                </a:solidFill>
+              </a:rPr>
+              <a:t>го ползват. </a:t>
+            </a:r>
+            <a:r>
+              <a:rPr lang="bg-BG" sz="2000" dirty="0" smtClean="0">
+                <a:solidFill>
+                  <a:schemeClr val="bg1">
+                    <a:lumMod val="95000"/>
+                  </a:schemeClr>
+                </a:solidFill>
+              </a:rPr>
+              <a:t>Също така не трябва да може да се създаде </a:t>
+            </a:r>
+            <a:r>
+              <a:rPr lang="en-US" sz="2000" dirty="0" smtClean="0">
+                <a:solidFill>
+                  <a:schemeClr val="bg1">
+                    <a:lumMod val="95000"/>
+                  </a:schemeClr>
+                </a:solidFill>
+              </a:rPr>
+              <a:t>Account </a:t>
+            </a:r>
+            <a:r>
+              <a:rPr lang="bg-BG" sz="2000" dirty="0" smtClean="0">
+                <a:solidFill>
+                  <a:schemeClr val="bg1">
+                    <a:lumMod val="95000"/>
+                  </a:schemeClr>
+                </a:solidFill>
+              </a:rPr>
+              <a:t>с отрицателна сметка и ако това се случи трябва да се хвърли друг собствен </a:t>
+            </a:r>
+            <a:r>
+              <a:rPr lang="en-US" sz="2000" dirty="0" smtClean="0">
+                <a:solidFill>
+                  <a:schemeClr val="bg1">
+                    <a:lumMod val="95000"/>
+                  </a:schemeClr>
+                </a:solidFill>
+              </a:rPr>
+              <a:t>exception (</a:t>
+            </a:r>
+            <a:r>
+              <a:rPr lang="en-US" sz="2000" dirty="0" err="1" smtClean="0">
+                <a:solidFill>
+                  <a:schemeClr val="bg1">
+                    <a:lumMod val="95000"/>
+                  </a:schemeClr>
+                </a:solidFill>
+              </a:rPr>
+              <a:t>NegativeMoneyException</a:t>
+            </a:r>
+            <a:r>
+              <a:rPr lang="en-US" sz="2000" dirty="0" smtClean="0">
+                <a:solidFill>
+                  <a:schemeClr val="bg1">
+                    <a:lumMod val="95000"/>
+                  </a:schemeClr>
+                </a:solidFill>
+              </a:rPr>
+              <a:t>)</a:t>
+            </a:r>
+            <a:r>
+              <a:rPr lang="bg-BG" sz="2000" dirty="0" smtClean="0">
+                <a:solidFill>
+                  <a:schemeClr val="bg1">
+                    <a:lumMod val="95000"/>
+                  </a:schemeClr>
+                </a:solidFill>
+              </a:rPr>
+              <a:t>.</a:t>
+            </a:r>
+            <a:endParaRPr lang="ru-RU" sz="2000" dirty="0">
+              <a:solidFill>
+                <a:schemeClr val="bg1">
+                  <a:lumMod val="95000"/>
+                </a:schemeClr>
+              </a:solidFill>
+            </a:endParaRPr>
           </a:p>
         </p:txBody>
       </p:sp>

</xml_diff>